<commit_message>
Built site for gcamextractor: 0.1.0@297c913
</commit_message>
<xml_diff>
--- a/articles/vignetteFigs/vignetteFigs_all.pptx
+++ b/articles/vignetteFigs/vignetteFigs_all.pptx
@@ -104,6 +104,11 @@
       </a:defRPr>
     </a:lvl9pPr>
   </p:defaultTextStyle>
+  <p:extLst>
+    <p:ext uri="{EFAFB233-063F-42B5-8137-9DF3F51BA10A}">
+      <p15:sldGuideLst xmlns:p15="http://schemas.microsoft.com/office/powerpoint/2012/main"/>
+    </p:ext>
+  </p:extLst>
 </p:presentation>
 </file>
 
@@ -254,7 +259,7 @@
           <a:p>
             <a:fld id="{64D635FF-E9BB-4242-BD6A-DBCDE5279233}" type="datetimeFigureOut">
               <a:rPr lang="en-US" smtClean="0"/>
-              <a:t>5/5/2021</a:t>
+              <a:t>5/23/2022</a:t>
             </a:fld>
             <a:endParaRPr lang="en-US"/>
           </a:p>
@@ -452,7 +457,7 @@
           <a:p>
             <a:fld id="{64D635FF-E9BB-4242-BD6A-DBCDE5279233}" type="datetimeFigureOut">
               <a:rPr lang="en-US" smtClean="0"/>
-              <a:t>5/5/2021</a:t>
+              <a:t>5/23/2022</a:t>
             </a:fld>
             <a:endParaRPr lang="en-US"/>
           </a:p>
@@ -660,7 +665,7 @@
           <a:p>
             <a:fld id="{64D635FF-E9BB-4242-BD6A-DBCDE5279233}" type="datetimeFigureOut">
               <a:rPr lang="en-US" smtClean="0"/>
-              <a:t>5/5/2021</a:t>
+              <a:t>5/23/2022</a:t>
             </a:fld>
             <a:endParaRPr lang="en-US"/>
           </a:p>
@@ -858,7 +863,7 @@
           <a:p>
             <a:fld id="{64D635FF-E9BB-4242-BD6A-DBCDE5279233}" type="datetimeFigureOut">
               <a:rPr lang="en-US" smtClean="0"/>
-              <a:t>5/5/2021</a:t>
+              <a:t>5/23/2022</a:t>
             </a:fld>
             <a:endParaRPr lang="en-US"/>
           </a:p>
@@ -1133,7 +1138,7 @@
           <a:p>
             <a:fld id="{64D635FF-E9BB-4242-BD6A-DBCDE5279233}" type="datetimeFigureOut">
               <a:rPr lang="en-US" smtClean="0"/>
-              <a:t>5/5/2021</a:t>
+              <a:t>5/23/2022</a:t>
             </a:fld>
             <a:endParaRPr lang="en-US"/>
           </a:p>
@@ -1398,7 +1403,7 @@
           <a:p>
             <a:fld id="{64D635FF-E9BB-4242-BD6A-DBCDE5279233}" type="datetimeFigureOut">
               <a:rPr lang="en-US" smtClean="0"/>
-              <a:t>5/5/2021</a:t>
+              <a:t>5/23/2022</a:t>
             </a:fld>
             <a:endParaRPr lang="en-US"/>
           </a:p>
@@ -1810,7 +1815,7 @@
           <a:p>
             <a:fld id="{64D635FF-E9BB-4242-BD6A-DBCDE5279233}" type="datetimeFigureOut">
               <a:rPr lang="en-US" smtClean="0"/>
-              <a:t>5/5/2021</a:t>
+              <a:t>5/23/2022</a:t>
             </a:fld>
             <a:endParaRPr lang="en-US"/>
           </a:p>
@@ -1951,7 +1956,7 @@
           <a:p>
             <a:fld id="{64D635FF-E9BB-4242-BD6A-DBCDE5279233}" type="datetimeFigureOut">
               <a:rPr lang="en-US" smtClean="0"/>
-              <a:t>5/5/2021</a:t>
+              <a:t>5/23/2022</a:t>
             </a:fld>
             <a:endParaRPr lang="en-US"/>
           </a:p>
@@ -2064,7 +2069,7 @@
           <a:p>
             <a:fld id="{64D635FF-E9BB-4242-BD6A-DBCDE5279233}" type="datetimeFigureOut">
               <a:rPr lang="en-US" smtClean="0"/>
-              <a:t>5/5/2021</a:t>
+              <a:t>5/23/2022</a:t>
             </a:fld>
             <a:endParaRPr lang="en-US"/>
           </a:p>
@@ -2375,7 +2380,7 @@
           <a:p>
             <a:fld id="{64D635FF-E9BB-4242-BD6A-DBCDE5279233}" type="datetimeFigureOut">
               <a:rPr lang="en-US" smtClean="0"/>
-              <a:t>5/5/2021</a:t>
+              <a:t>5/23/2022</a:t>
             </a:fld>
             <a:endParaRPr lang="en-US"/>
           </a:p>
@@ -2663,7 +2668,7 @@
           <a:p>
             <a:fld id="{64D635FF-E9BB-4242-BD6A-DBCDE5279233}" type="datetimeFigureOut">
               <a:rPr lang="en-US" smtClean="0"/>
-              <a:t>5/5/2021</a:t>
+              <a:t>5/23/2022</a:t>
             </a:fld>
             <a:endParaRPr lang="en-US"/>
           </a:p>
@@ -2904,7 +2909,7 @@
           <a:p>
             <a:fld id="{64D635FF-E9BB-4242-BD6A-DBCDE5279233}" type="datetimeFigureOut">
               <a:rPr lang="en-US" smtClean="0"/>
-              <a:t>5/5/2021</a:t>
+              <a:t>5/23/2022</a:t>
             </a:fld>
             <a:endParaRPr lang="en-US"/>
           </a:p>
@@ -3321,42 +3326,6 @@
           <a:chExt cx="0" cy="0"/>
         </a:xfrm>
       </p:grpSpPr>
-      <p:sp>
-        <p:nvSpPr>
-          <p:cNvPr id="9" name="TextBox 8">
-            <a:extLst>
-              <a:ext uri="{FF2B5EF4-FFF2-40B4-BE49-F238E27FC236}">
-                <a16:creationId xmlns:a16="http://schemas.microsoft.com/office/drawing/2014/main" id="{05E4B6E4-0AAF-4141-8E53-1E0DD128E55F}"/>
-              </a:ext>
-            </a:extLst>
-          </p:cNvPr>
-          <p:cNvSpPr txBox="1"/>
-          <p:nvPr/>
-        </p:nvSpPr>
-        <p:spPr>
-          <a:xfrm>
-            <a:off x="192163" y="128664"/>
-            <a:ext cx="2066223" cy="369332"/>
-          </a:xfrm>
-          <a:prstGeom prst="rect">
-            <a:avLst/>
-          </a:prstGeom>
-          <a:noFill/>
-        </p:spPr>
-        <p:txBody>
-          <a:bodyPr wrap="square" rtlCol="0">
-            <a:spAutoFit/>
-          </a:bodyPr>
-          <a:lstStyle/>
-          <a:p>
-            <a:pPr algn="ctr"/>
-            <a:r>
-              <a:rPr lang="en-US" b="1"/>
-              <a:t>Param List</a:t>
-            </a:r>
-          </a:p>
-        </p:txBody>
-      </p:sp>
       <p:grpSp>
         <p:nvGrpSpPr>
           <p:cNvPr id="21" name="Group 20">
@@ -3371,10 +3340,10 @@
         </p:nvGrpSpPr>
         <p:grpSpPr>
           <a:xfrm>
-            <a:off x="1319952" y="661312"/>
-            <a:ext cx="10124134" cy="4923134"/>
+            <a:off x="265472" y="334461"/>
+            <a:ext cx="11812389" cy="5769163"/>
             <a:chOff x="1319952" y="661312"/>
-            <a:chExt cx="10124134" cy="4923134"/>
+            <a:chExt cx="10124134" cy="5075691"/>
           </a:xfrm>
         </p:grpSpPr>
         <p:sp>
@@ -3392,7 +3361,7 @@
           <p:spPr>
             <a:xfrm>
               <a:off x="1319952" y="1050576"/>
-              <a:ext cx="2216370" cy="4533870"/>
+              <a:ext cx="2216370" cy="4686427"/>
             </a:xfrm>
             <a:prstGeom prst="rect">
               <a:avLst/>
@@ -3418,7 +3387,7 @@
             </a:lstStyle>
             <a:p>
               <a:r>
-                <a:rPr lang="en-US" altLang="en-US" sz="1200" b="1" dirty="0">
+                <a:rPr lang="en-US" altLang="en-US" sz="1600" b="1" dirty="0">
                   <a:solidFill>
                     <a:srgbClr val="0070C0"/>
                   </a:solidFill>
@@ -3433,12 +3402,12 @@
                 <a:buChar char="•"/>
               </a:pPr>
               <a:r>
-                <a:rPr lang="en-US" altLang="en-US" sz="1050" dirty="0" err="1">
+                <a:rPr lang="en-US" altLang="en-US" sz="1200" dirty="0" err="1">
                   <a:latin typeface="+mn-lt"/>
                 </a:rPr>
                 <a:t>gdpPerCapita</a:t>
               </a:r>
-              <a:endParaRPr lang="en-US" altLang="en-US" sz="1050" dirty="0">
+              <a:endParaRPr lang="en-US" altLang="en-US" sz="1200" dirty="0">
                 <a:latin typeface="+mn-lt"/>
               </a:endParaRPr>
             </a:p>
@@ -3448,12 +3417,12 @@
                 <a:buChar char="•"/>
               </a:pPr>
               <a:r>
-                <a:rPr lang="en-US" altLang="en-US" sz="1050" dirty="0" err="1">
+                <a:rPr lang="en-US" altLang="en-US" sz="1200" dirty="0" err="1">
                   <a:latin typeface="+mn-lt"/>
                 </a:rPr>
                 <a:t>gdp</a:t>
               </a:r>
-              <a:endParaRPr lang="en-US" altLang="en-US" sz="1050" dirty="0">
+              <a:endParaRPr lang="en-US" altLang="en-US" sz="1200" dirty="0">
                 <a:latin typeface="+mn-lt"/>
               </a:endParaRPr>
             </a:p>
@@ -3463,12 +3432,12 @@
                 <a:buChar char="•"/>
               </a:pPr>
               <a:r>
-                <a:rPr lang="en-US" altLang="en-US" sz="1050" dirty="0" err="1">
+                <a:rPr lang="en-US" altLang="en-US" sz="1200" dirty="0" err="1">
                   <a:latin typeface="+mn-lt"/>
                 </a:rPr>
                 <a:t>gdpGrowthRate</a:t>
               </a:r>
-              <a:endParaRPr lang="en-US" altLang="en-US" sz="1050" dirty="0">
+              <a:endParaRPr lang="en-US" altLang="en-US" sz="1200" dirty="0">
                 <a:latin typeface="+mn-lt"/>
               </a:endParaRPr>
             </a:p>
@@ -3478,7 +3447,7 @@
                 <a:buChar char="•"/>
               </a:pPr>
               <a:r>
-                <a:rPr lang="en-US" altLang="en-US" sz="1050" dirty="0">
+                <a:rPr lang="en-US" altLang="en-US" sz="1200" dirty="0">
                   <a:latin typeface="+mn-lt"/>
                 </a:rPr>
                 <a:t>Pop</a:t>
@@ -3486,7 +3455,7 @@
             </a:p>
             <a:p>
               <a:r>
-                <a:rPr lang="en-US" altLang="en-US" sz="1200" b="1" dirty="0">
+                <a:rPr lang="en-US" altLang="en-US" sz="1600" b="1" dirty="0">
                   <a:solidFill>
                     <a:srgbClr val="0070C0"/>
                   </a:solidFill>
@@ -3501,12 +3470,12 @@
                 <a:buChar char="•"/>
               </a:pPr>
               <a:r>
-                <a:rPr lang="en-US" altLang="en-US" sz="1050" dirty="0" err="1">
+                <a:rPr lang="en-US" altLang="en-US" sz="1200" dirty="0" err="1">
                   <a:latin typeface="+mn-lt"/>
                 </a:rPr>
                 <a:t>transportPassengerVMTByMode</a:t>
               </a:r>
-              <a:endParaRPr lang="en-US" altLang="en-US" sz="1050" dirty="0">
+              <a:endParaRPr lang="en-US" altLang="en-US" sz="1200" dirty="0">
                 <a:latin typeface="+mn-lt"/>
               </a:endParaRPr>
             </a:p>
@@ -3516,12 +3485,12 @@
                 <a:buChar char="•"/>
               </a:pPr>
               <a:r>
-                <a:rPr lang="en-US" altLang="en-US" sz="1050" dirty="0" err="1">
+                <a:rPr lang="en-US" altLang="en-US" sz="1200" dirty="0" err="1">
                   <a:latin typeface="+mn-lt"/>
                 </a:rPr>
                 <a:t>transportFreightVMTByMode</a:t>
               </a:r>
-              <a:endParaRPr lang="en-US" altLang="en-US" sz="1050" dirty="0">
+              <a:endParaRPr lang="en-US" altLang="en-US" sz="1200" dirty="0">
                 <a:latin typeface="+mn-lt"/>
               </a:endParaRPr>
             </a:p>
@@ -3531,12 +3500,12 @@
                 <a:buChar char="•"/>
               </a:pPr>
               <a:r>
-                <a:rPr lang="en-US" altLang="en-US" sz="1050" dirty="0" err="1">
+                <a:rPr lang="en-US" altLang="en-US" sz="1200" dirty="0" err="1">
                   <a:latin typeface="+mn-lt"/>
                 </a:rPr>
                 <a:t>transportPassengerVMTByFuel</a:t>
               </a:r>
-              <a:endParaRPr lang="en-US" altLang="en-US" sz="1050" dirty="0">
+              <a:endParaRPr lang="en-US" altLang="en-US" sz="1200" dirty="0">
                 <a:latin typeface="+mn-lt"/>
               </a:endParaRPr>
             </a:p>
@@ -3546,18 +3515,18 @@
                 <a:buChar char="•"/>
               </a:pPr>
               <a:r>
-                <a:rPr lang="en-US" altLang="en-US" sz="1050" dirty="0" err="1">
+                <a:rPr lang="en-US" altLang="en-US" sz="1200" dirty="0" err="1">
                   <a:latin typeface="+mn-lt"/>
                 </a:rPr>
                 <a:t>transportFreightVMTByFuel</a:t>
               </a:r>
-              <a:endParaRPr lang="en-US" altLang="en-US" sz="1050" dirty="0">
+              <a:endParaRPr lang="en-US" altLang="en-US" sz="1200" dirty="0">
                 <a:latin typeface="+mn-lt"/>
               </a:endParaRPr>
             </a:p>
             <a:p>
               <a:r>
-                <a:rPr lang="en-US" altLang="en-US" sz="1200" b="1" dirty="0">
+                <a:rPr lang="en-US" altLang="en-US" sz="1600" b="1" dirty="0">
                   <a:solidFill>
                     <a:srgbClr val="0070C0"/>
                   </a:solidFill>
@@ -3565,7 +3534,7 @@
                 </a:rPr>
                 <a:t>Water</a:t>
               </a:r>
-              <a:endParaRPr lang="en-US" altLang="en-US" sz="1050" b="1" dirty="0">
+              <a:endParaRPr lang="en-US" altLang="en-US" sz="1200" b="1" dirty="0">
                 <a:solidFill>
                   <a:srgbClr val="0070C0"/>
                 </a:solidFill>
@@ -3578,12 +3547,12 @@
                 <a:buChar char="•"/>
               </a:pPr>
               <a:r>
-                <a:rPr lang="en-US" altLang="en-US" sz="1050" dirty="0" err="1">
+                <a:rPr lang="en-US" altLang="en-US" sz="1200" dirty="0" err="1">
                   <a:latin typeface="+mn-lt"/>
                 </a:rPr>
                 <a:t>watConsumBySec</a:t>
               </a:r>
-              <a:endParaRPr lang="en-US" altLang="en-US" sz="1050" dirty="0">
+              <a:endParaRPr lang="en-US" altLang="en-US" sz="1200" dirty="0">
                 <a:latin typeface="+mn-lt"/>
               </a:endParaRPr>
             </a:p>
@@ -3593,12 +3562,12 @@
                 <a:buChar char="•"/>
               </a:pPr>
               <a:r>
-                <a:rPr lang="en-US" altLang="en-US" sz="1050" dirty="0" err="1">
+                <a:rPr lang="en-US" altLang="en-US" sz="1200" dirty="0" err="1">
                   <a:latin typeface="+mn-lt"/>
                 </a:rPr>
                 <a:t>watWithdrawBySec</a:t>
               </a:r>
-              <a:endParaRPr lang="en-US" altLang="en-US" sz="1050" dirty="0">
+              <a:endParaRPr lang="en-US" altLang="en-US" sz="1200" dirty="0">
                 <a:latin typeface="+mn-lt"/>
               </a:endParaRPr>
             </a:p>
@@ -3608,12 +3577,12 @@
                 <a:buChar char="•"/>
               </a:pPr>
               <a:r>
-                <a:rPr lang="en-US" altLang="en-US" sz="1050" dirty="0" err="1">
+                <a:rPr lang="en-US" altLang="en-US" sz="1200" dirty="0" err="1">
                   <a:latin typeface="+mn-lt"/>
                 </a:rPr>
                 <a:t>watWithdrawByCrop</a:t>
               </a:r>
-              <a:endParaRPr lang="en-US" altLang="en-US" sz="1050" dirty="0">
+              <a:endParaRPr lang="en-US" altLang="en-US" sz="1200" dirty="0">
                 <a:latin typeface="+mn-lt"/>
               </a:endParaRPr>
             </a:p>
@@ -3623,12 +3592,12 @@
                 <a:buChar char="•"/>
               </a:pPr>
               <a:r>
-                <a:rPr lang="en-US" altLang="en-US" sz="1050" dirty="0" err="1">
+                <a:rPr lang="en-US" altLang="en-US" sz="1200" dirty="0" err="1">
                   <a:latin typeface="+mn-lt"/>
                 </a:rPr>
                 <a:t>watBioPhysCons</a:t>
               </a:r>
-              <a:endParaRPr lang="en-US" altLang="en-US" sz="1050" dirty="0">
+              <a:endParaRPr lang="en-US" altLang="en-US" sz="1200" dirty="0">
                 <a:latin typeface="+mn-lt"/>
               </a:endParaRPr>
             </a:p>
@@ -3638,12 +3607,12 @@
                 <a:buChar char="•"/>
               </a:pPr>
               <a:r>
-                <a:rPr lang="en-US" altLang="en-US" sz="1050" dirty="0" err="1">
+                <a:rPr lang="en-US" altLang="en-US" sz="1200" dirty="0" err="1">
                   <a:latin typeface="+mn-lt"/>
                 </a:rPr>
                 <a:t>watIrrWithdrawBasin</a:t>
               </a:r>
-              <a:endParaRPr lang="en-US" altLang="en-US" sz="1050" dirty="0">
+              <a:endParaRPr lang="en-US" altLang="en-US" sz="1200" dirty="0">
                 <a:latin typeface="+mn-lt"/>
               </a:endParaRPr>
             </a:p>
@@ -3653,12 +3622,12 @@
                 <a:buChar char="•"/>
               </a:pPr>
               <a:r>
-                <a:rPr lang="en-US" altLang="en-US" sz="1050" dirty="0" err="1">
+                <a:rPr lang="en-US" altLang="en-US" sz="1200" dirty="0" err="1">
                   <a:latin typeface="+mn-lt"/>
                 </a:rPr>
                 <a:t>watIrrConsBasin</a:t>
               </a:r>
-              <a:endParaRPr lang="en-US" altLang="en-US" sz="1050" dirty="0">
+              <a:endParaRPr lang="en-US" altLang="en-US" sz="1200" dirty="0">
                 <a:latin typeface="+mn-lt"/>
               </a:endParaRPr>
             </a:p>
@@ -3668,12 +3637,12 @@
                 <a:buChar char="•"/>
               </a:pPr>
               <a:r>
-                <a:rPr lang="en-US" altLang="en-US" sz="1050" dirty="0" err="1">
+                <a:rPr lang="en-US" altLang="en-US" sz="1200" dirty="0" err="1">
                   <a:latin typeface="+mn-lt"/>
                 </a:rPr>
                 <a:t>watSupRunoffBasin</a:t>
               </a:r>
-              <a:endParaRPr lang="en-US" altLang="en-US" sz="1050" dirty="0">
+              <a:endParaRPr lang="en-US" altLang="en-US" sz="1200" dirty="0">
                 <a:latin typeface="+mn-lt"/>
               </a:endParaRPr>
             </a:p>
@@ -3694,7 +3663,7 @@
           <p:spPr>
             <a:xfrm>
               <a:off x="3884433" y="1050576"/>
-              <a:ext cx="2323533" cy="4291496"/>
+              <a:ext cx="2323533" cy="4442724"/>
             </a:xfrm>
             <a:prstGeom prst="rect">
               <a:avLst/>
@@ -3720,7 +3689,7 @@
             </a:lstStyle>
             <a:p>
               <a:r>
-                <a:rPr lang="en-US" altLang="en-US" sz="1200" b="1" dirty="0">
+                <a:rPr lang="en-US" altLang="en-US" sz="1600" b="1" dirty="0">
                   <a:solidFill>
                     <a:srgbClr val="0070C0"/>
                   </a:solidFill>
@@ -3728,7 +3697,7 @@
                 </a:rPr>
                 <a:t>Agriculture</a:t>
               </a:r>
-              <a:endParaRPr lang="en-US" altLang="en-US" sz="1050" b="1" dirty="0">
+              <a:endParaRPr lang="en-US" altLang="en-US" sz="1200" b="1" dirty="0">
                 <a:solidFill>
                   <a:srgbClr val="0070C0"/>
                 </a:solidFill>
@@ -3741,12 +3710,12 @@
                 <a:buChar char="•"/>
               </a:pPr>
               <a:r>
-                <a:rPr lang="en-US" altLang="en-US" sz="1050" dirty="0" err="1">
+                <a:rPr lang="en-US" altLang="en-US" sz="1200" dirty="0" err="1">
                   <a:latin typeface="+mn-lt"/>
                 </a:rPr>
                 <a:t>agProdbyIrrRfd</a:t>
               </a:r>
-              <a:endParaRPr lang="en-US" altLang="en-US" sz="1050" dirty="0">
+              <a:endParaRPr lang="en-US" altLang="en-US" sz="1200" dirty="0">
                 <a:latin typeface="+mn-lt"/>
               </a:endParaRPr>
             </a:p>
@@ -3756,12 +3725,12 @@
                 <a:buChar char="•"/>
               </a:pPr>
               <a:r>
-                <a:rPr lang="en-US" altLang="en-US" sz="1050" dirty="0" err="1">
+                <a:rPr lang="en-US" altLang="en-US" sz="1200" dirty="0" err="1">
                   <a:latin typeface="+mn-lt"/>
                 </a:rPr>
                 <a:t>agProdBiomass</a:t>
               </a:r>
-              <a:endParaRPr lang="en-US" altLang="en-US" sz="1050" dirty="0">
+              <a:endParaRPr lang="en-US" altLang="en-US" sz="1200" dirty="0">
                 <a:latin typeface="+mn-lt"/>
               </a:endParaRPr>
             </a:p>
@@ -3771,12 +3740,12 @@
                 <a:buChar char="•"/>
               </a:pPr>
               <a:r>
-                <a:rPr lang="en-US" altLang="en-US" sz="1050" dirty="0" err="1">
+                <a:rPr lang="en-US" altLang="en-US" sz="1200" dirty="0" err="1">
                   <a:latin typeface="+mn-lt"/>
                 </a:rPr>
                 <a:t>agProdForest</a:t>
               </a:r>
-              <a:endParaRPr lang="en-US" altLang="en-US" sz="1050" dirty="0">
+              <a:endParaRPr lang="en-US" altLang="en-US" sz="1200" dirty="0">
                 <a:latin typeface="+mn-lt"/>
               </a:endParaRPr>
             </a:p>
@@ -3786,18 +3755,18 @@
                 <a:buChar char="•"/>
               </a:pPr>
               <a:r>
-                <a:rPr lang="en-US" altLang="en-US" sz="1050" dirty="0" err="1">
+                <a:rPr lang="en-US" altLang="en-US" sz="1200" dirty="0" err="1">
                   <a:latin typeface="+mn-lt"/>
                 </a:rPr>
                 <a:t>agProdByCrop</a:t>
               </a:r>
-              <a:endParaRPr lang="en-US" altLang="en-US" sz="1050" dirty="0">
+              <a:endParaRPr lang="en-US" altLang="en-US" sz="1200" dirty="0">
                 <a:latin typeface="+mn-lt"/>
               </a:endParaRPr>
             </a:p>
             <a:p>
               <a:r>
-                <a:rPr lang="en-US" altLang="en-US" sz="1200" b="1" dirty="0">
+                <a:rPr lang="en-US" altLang="en-US" sz="1600" b="1" dirty="0">
                   <a:solidFill>
                     <a:srgbClr val="0070C0"/>
                   </a:solidFill>
@@ -3805,7 +3774,7 @@
                 </a:rPr>
                 <a:t>Livestock</a:t>
               </a:r>
-              <a:endParaRPr lang="en-US" altLang="en-US" sz="1050" b="1" dirty="0">
+              <a:endParaRPr lang="en-US" altLang="en-US" sz="1200" b="1" dirty="0">
                 <a:solidFill>
                   <a:srgbClr val="0070C0"/>
                 </a:solidFill>
@@ -3818,12 +3787,12 @@
                 <a:buChar char="•"/>
               </a:pPr>
               <a:r>
-                <a:rPr lang="en-US" altLang="en-US" sz="1050" dirty="0" err="1">
+                <a:rPr lang="en-US" altLang="en-US" sz="1200" dirty="0" err="1">
                   <a:latin typeface="+mn-lt"/>
                 </a:rPr>
                 <a:t>livestock_MeatDairybyTechMixed</a:t>
               </a:r>
-              <a:endParaRPr lang="en-US" altLang="en-US" sz="1050" dirty="0">
+              <a:endParaRPr lang="en-US" altLang="en-US" sz="1200" dirty="0">
                 <a:latin typeface="+mn-lt"/>
               </a:endParaRPr>
             </a:p>
@@ -3833,12 +3802,12 @@
                 <a:buChar char="•"/>
               </a:pPr>
               <a:r>
-                <a:rPr lang="en-US" altLang="en-US" sz="1050" dirty="0" err="1">
+                <a:rPr lang="en-US" altLang="en-US" sz="1200" dirty="0" err="1">
                   <a:latin typeface="+mn-lt"/>
                 </a:rPr>
                 <a:t>livestock_MeatDairybyTechPastoral</a:t>
               </a:r>
-              <a:endParaRPr lang="en-US" altLang="en-US" sz="1050" dirty="0">
+              <a:endParaRPr lang="en-US" altLang="en-US" sz="1200" dirty="0">
                 <a:latin typeface="+mn-lt"/>
               </a:endParaRPr>
             </a:p>
@@ -3848,12 +3817,12 @@
                 <a:buChar char="•"/>
               </a:pPr>
               <a:r>
-                <a:rPr lang="en-US" altLang="en-US" sz="1050" dirty="0" err="1">
+                <a:rPr lang="en-US" altLang="en-US" sz="1200" dirty="0" err="1">
                   <a:latin typeface="+mn-lt"/>
                 </a:rPr>
                 <a:t>livestock_MeatDairybyTechImports</a:t>
               </a:r>
-              <a:endParaRPr lang="en-US" altLang="en-US" sz="1050" dirty="0">
+              <a:endParaRPr lang="en-US" altLang="en-US" sz="1200" dirty="0">
                 <a:latin typeface="+mn-lt"/>
               </a:endParaRPr>
             </a:p>
@@ -3863,18 +3832,18 @@
                 <a:buChar char="•"/>
               </a:pPr>
               <a:r>
-                <a:rPr lang="en-US" altLang="en-US" sz="1050" dirty="0" err="1">
+                <a:rPr lang="en-US" altLang="en-US" sz="1200" dirty="0" err="1">
                   <a:latin typeface="+mn-lt"/>
                 </a:rPr>
                 <a:t>livestock_MeatDairybySubsector</a:t>
               </a:r>
-              <a:endParaRPr lang="en-US" altLang="en-US" sz="1050" dirty="0">
+              <a:endParaRPr lang="en-US" altLang="en-US" sz="1200" dirty="0">
                 <a:latin typeface="+mn-lt"/>
               </a:endParaRPr>
             </a:p>
             <a:p>
               <a:r>
-                <a:rPr lang="en-US" altLang="en-US" sz="1200" b="1" dirty="0">
+                <a:rPr lang="en-US" altLang="en-US" sz="1600" b="1" dirty="0">
                   <a:solidFill>
                     <a:srgbClr val="0070C0"/>
                   </a:solidFill>
@@ -3882,7 +3851,7 @@
                 </a:rPr>
                 <a:t>Land</a:t>
               </a:r>
-              <a:endParaRPr lang="en-US" altLang="en-US" sz="1050" b="1" dirty="0">
+              <a:endParaRPr lang="en-US" altLang="en-US" sz="1200" b="1" dirty="0">
                 <a:solidFill>
                   <a:srgbClr val="0070C0"/>
                 </a:solidFill>
@@ -3895,12 +3864,12 @@
                 <a:buChar char="•"/>
               </a:pPr>
               <a:r>
-                <a:rPr lang="en-US" altLang="en-US" sz="1050" dirty="0" err="1">
+                <a:rPr lang="en-US" altLang="en-US" sz="1200" dirty="0" err="1">
                   <a:latin typeface="+mn-lt"/>
                 </a:rPr>
                 <a:t>landIrrRfd</a:t>
               </a:r>
-              <a:endParaRPr lang="en-US" altLang="en-US" sz="1050" dirty="0">
+              <a:endParaRPr lang="en-US" altLang="en-US" sz="1200" dirty="0">
                 <a:latin typeface="+mn-lt"/>
               </a:endParaRPr>
             </a:p>
@@ -3910,12 +3879,12 @@
                 <a:buChar char="•"/>
               </a:pPr>
               <a:r>
-                <a:rPr lang="en-US" altLang="en-US" sz="1050" dirty="0" err="1">
+                <a:rPr lang="en-US" altLang="en-US" sz="1200" dirty="0" err="1">
                   <a:latin typeface="+mn-lt"/>
                 </a:rPr>
                 <a:t>landIrrCrop</a:t>
               </a:r>
-              <a:endParaRPr lang="en-US" altLang="en-US" sz="1050" dirty="0">
+              <a:endParaRPr lang="en-US" altLang="en-US" sz="1200" dirty="0">
                 <a:latin typeface="+mn-lt"/>
               </a:endParaRPr>
             </a:p>
@@ -3925,12 +3894,12 @@
                 <a:buChar char="•"/>
               </a:pPr>
               <a:r>
-                <a:rPr lang="en-US" altLang="en-US" sz="1050" dirty="0" err="1">
+                <a:rPr lang="en-US" altLang="en-US" sz="1200" dirty="0" err="1">
                   <a:latin typeface="+mn-lt"/>
                 </a:rPr>
                 <a:t>landRfdCrop</a:t>
               </a:r>
-              <a:endParaRPr lang="en-US" altLang="en-US" sz="1050" dirty="0">
+              <a:endParaRPr lang="en-US" altLang="en-US" sz="1200" dirty="0">
                 <a:latin typeface="+mn-lt"/>
               </a:endParaRPr>
             </a:p>
@@ -3940,12 +3909,12 @@
                 <a:buChar char="•"/>
               </a:pPr>
               <a:r>
-                <a:rPr lang="en-US" altLang="en-US" sz="1050" dirty="0" err="1">
+                <a:rPr lang="en-US" altLang="en-US" sz="1200" dirty="0" err="1">
                   <a:latin typeface="+mn-lt"/>
                 </a:rPr>
                 <a:t>landAlloc</a:t>
               </a:r>
-              <a:endParaRPr lang="en-US" altLang="en-US" sz="1050" dirty="0">
+              <a:endParaRPr lang="en-US" altLang="en-US" sz="1200" dirty="0">
                 <a:latin typeface="+mn-lt"/>
               </a:endParaRPr>
             </a:p>
@@ -3955,18 +3924,18 @@
                 <a:buChar char="•"/>
               </a:pPr>
               <a:r>
-                <a:rPr lang="en-US" altLang="en-US" sz="1050" dirty="0" err="1">
+                <a:rPr lang="en-US" altLang="en-US" sz="1200" dirty="0" err="1">
                   <a:latin typeface="+mn-lt"/>
                 </a:rPr>
                 <a:t>landAllocByCrop</a:t>
               </a:r>
-              <a:endParaRPr lang="en-US" altLang="en-US" sz="1050" dirty="0">
+              <a:endParaRPr lang="en-US" altLang="en-US" sz="1200" dirty="0">
                 <a:latin typeface="+mn-lt"/>
               </a:endParaRPr>
             </a:p>
             <a:p>
               <a:pPr algn="ctr"/>
-              <a:endParaRPr lang="en-US" altLang="en-US" sz="1050" dirty="0">
+              <a:endParaRPr lang="en-US" altLang="en-US" sz="1200" dirty="0">
                 <a:latin typeface="+mn-lt"/>
               </a:endParaRPr>
             </a:p>
@@ -3987,7 +3956,7 @@
           <p:spPr>
             <a:xfrm>
               <a:off x="6556077" y="1050576"/>
-              <a:ext cx="2216370" cy="4429995"/>
+              <a:ext cx="2216370" cy="4523958"/>
             </a:xfrm>
             <a:prstGeom prst="rect">
               <a:avLst/>
@@ -4013,7 +3982,7 @@
             </a:lstStyle>
             <a:p>
               <a:r>
-                <a:rPr lang="en-US" altLang="en-US" sz="1200" b="1" dirty="0">
+                <a:rPr lang="en-US" altLang="en-US" sz="1600" b="1" dirty="0">
                   <a:solidFill>
                     <a:srgbClr val="0070C0"/>
                   </a:solidFill>
@@ -4021,7 +3990,7 @@
                 </a:rPr>
                 <a:t>Emissions</a:t>
               </a:r>
-              <a:endParaRPr lang="en-US" altLang="en-US" sz="1050" b="1" dirty="0">
+              <a:endParaRPr lang="en-US" altLang="en-US" sz="1200" b="1" dirty="0">
                 <a:solidFill>
                   <a:srgbClr val="0070C0"/>
                 </a:solidFill>
@@ -4034,7 +4003,7 @@
                 <a:buChar char="•"/>
               </a:pPr>
               <a:r>
-                <a:rPr lang="en-US" altLang="en-US" sz="1050" dirty="0">
+                <a:rPr lang="en-US" altLang="en-US" sz="1200" dirty="0">
                   <a:latin typeface="+mn-lt"/>
                 </a:rPr>
                 <a:t>emissNonCO2BySectorGWPAR5</a:t>
@@ -4046,7 +4015,7 @@
                 <a:buChar char="•"/>
               </a:pPr>
               <a:r>
-                <a:rPr lang="en-US" altLang="en-US" sz="1050" dirty="0">
+                <a:rPr lang="en-US" altLang="en-US" sz="1200" dirty="0">
                   <a:latin typeface="+mn-lt"/>
                 </a:rPr>
                 <a:t>emissNonCO2BySectorGTPAR5</a:t>
@@ -4058,7 +4027,7 @@
                 <a:buChar char="•"/>
               </a:pPr>
               <a:r>
-                <a:rPr lang="en-US" altLang="en-US" sz="1050" dirty="0">
+                <a:rPr lang="en-US" altLang="en-US" sz="1200" dirty="0">
                   <a:latin typeface="+mn-lt"/>
                 </a:rPr>
                 <a:t>emissNonCO2BySectorOrigUnits</a:t>
@@ -4070,12 +4039,12 @@
                 <a:buChar char="•"/>
               </a:pPr>
               <a:r>
-                <a:rPr lang="en-US" altLang="en-US" sz="1050" dirty="0" err="1">
+                <a:rPr lang="en-US" altLang="en-US" sz="1200" dirty="0" err="1">
                   <a:latin typeface="+mn-lt"/>
                 </a:rPr>
                 <a:t>emissLUC</a:t>
               </a:r>
-              <a:endParaRPr lang="en-US" altLang="en-US" sz="1050" dirty="0">
+              <a:endParaRPr lang="en-US" altLang="en-US" sz="1200" dirty="0">
                 <a:latin typeface="+mn-lt"/>
               </a:endParaRPr>
             </a:p>
@@ -4085,7 +4054,7 @@
                 <a:buChar char="•"/>
               </a:pPr>
               <a:r>
-                <a:rPr lang="en-US" altLang="en-US" sz="1050" dirty="0">
+                <a:rPr lang="en-US" altLang="en-US" sz="1200" dirty="0">
                   <a:latin typeface="+mn-lt"/>
                 </a:rPr>
                 <a:t>emissCO2BySectorNoBio</a:t>
@@ -4097,7 +4066,7 @@
                 <a:buChar char="•"/>
               </a:pPr>
               <a:r>
-                <a:rPr lang="en-US" altLang="en-US" sz="1050" dirty="0">
+                <a:rPr lang="en-US" altLang="en-US" sz="1200" dirty="0">
                   <a:latin typeface="+mn-lt"/>
                 </a:rPr>
                 <a:t>emissNonCO2ByResProdGWPAR5</a:t>
@@ -4109,7 +4078,7 @@
                 <a:buChar char="•"/>
               </a:pPr>
               <a:r>
-                <a:rPr lang="en-US" altLang="en-US" sz="1050" dirty="0">
+                <a:rPr lang="en-US" altLang="en-US" sz="1200" dirty="0">
                   <a:latin typeface="+mn-lt"/>
                 </a:rPr>
                 <a:t>emissMethaneBySourceGWPAR5</a:t>
@@ -4121,7 +4090,7 @@
                 <a:buChar char="•"/>
               </a:pPr>
               <a:r>
-                <a:rPr lang="en-US" altLang="en-US" sz="1050" dirty="0">
+                <a:rPr lang="en-US" altLang="en-US" sz="1200" dirty="0">
                   <a:latin typeface="+mn-lt"/>
                 </a:rPr>
                 <a:t>emissByGasGWPAR5FFI</a:t>
@@ -4133,7 +4102,7 @@
                 <a:buChar char="•"/>
               </a:pPr>
               <a:r>
-                <a:rPr lang="en-US" altLang="en-US" sz="1050" dirty="0">
+                <a:rPr lang="en-US" altLang="en-US" sz="1200" dirty="0">
                   <a:latin typeface="+mn-lt"/>
                 </a:rPr>
                 <a:t>emissByGasGWPAR5LUC</a:t>
@@ -4145,7 +4114,7 @@
                 <a:buChar char="•"/>
               </a:pPr>
               <a:r>
-                <a:rPr lang="en-US" altLang="en-US" sz="1050" dirty="0">
+                <a:rPr lang="en-US" altLang="en-US" sz="1200" dirty="0">
                   <a:latin typeface="+mn-lt"/>
                 </a:rPr>
                 <a:t>emissBySectorGWPAR5FFI</a:t>
@@ -4157,7 +4126,7 @@
                 <a:buChar char="•"/>
               </a:pPr>
               <a:r>
-                <a:rPr lang="en-US" altLang="en-US" sz="1050" dirty="0">
+                <a:rPr lang="en-US" altLang="en-US" sz="1200" dirty="0">
                   <a:latin typeface="+mn-lt"/>
                 </a:rPr>
                 <a:t>emissBySectorGWPAR5LUC</a:t>
@@ -4169,7 +4138,7 @@
                 <a:buChar char="•"/>
               </a:pPr>
               <a:r>
-                <a:rPr lang="en-US" altLang="en-US" sz="1050" dirty="0">
+                <a:rPr lang="en-US" altLang="en-US" sz="1200" dirty="0">
                   <a:latin typeface="+mn-lt"/>
                 </a:rPr>
                 <a:t>emissNonCO2ByResProdGTPAR5</a:t>
@@ -4181,7 +4150,7 @@
                 <a:buChar char="•"/>
               </a:pPr>
               <a:r>
-                <a:rPr lang="en-US" altLang="en-US" sz="1050" dirty="0">
+                <a:rPr lang="en-US" altLang="en-US" sz="1200" dirty="0">
                   <a:latin typeface="+mn-lt"/>
                 </a:rPr>
                 <a:t>emissMethaneBySourceGTPAR5</a:t>
@@ -4193,7 +4162,7 @@
                 <a:buChar char="•"/>
               </a:pPr>
               <a:r>
-                <a:rPr lang="en-US" altLang="en-US" sz="1050" dirty="0">
+                <a:rPr lang="en-US" altLang="en-US" sz="1200" dirty="0">
                   <a:latin typeface="+mn-lt"/>
                 </a:rPr>
                 <a:t>emissByGasGTPAR5FFI</a:t>
@@ -4205,7 +4174,7 @@
                 <a:buChar char="•"/>
               </a:pPr>
               <a:r>
-                <a:rPr lang="en-US" altLang="en-US" sz="1050" dirty="0">
+                <a:rPr lang="en-US" altLang="en-US" sz="1200" dirty="0">
                   <a:latin typeface="+mn-lt"/>
                 </a:rPr>
                 <a:t>emissByGasGTPAR5LUC</a:t>
@@ -4217,7 +4186,7 @@
                 <a:buChar char="•"/>
               </a:pPr>
               <a:r>
-                <a:rPr lang="en-US" altLang="en-US" sz="1050" dirty="0">
+                <a:rPr lang="en-US" altLang="en-US" sz="1200" dirty="0">
                   <a:latin typeface="+mn-lt"/>
                 </a:rPr>
                 <a:t>emissBySectorGTPAR5FFI</a:t>
@@ -4229,7 +4198,7 @@
                 <a:buChar char="•"/>
               </a:pPr>
               <a:r>
-                <a:rPr lang="en-US" altLang="en-US" sz="1050" dirty="0">
+                <a:rPr lang="en-US" altLang="en-US" sz="1200" dirty="0">
                   <a:latin typeface="+mn-lt"/>
                 </a:rPr>
                 <a:t>emissBySectorGTPAR5LUC</a:t>
@@ -4252,7 +4221,7 @@
           <p:spPr>
             <a:xfrm>
               <a:off x="9120558" y="1050576"/>
-              <a:ext cx="2323528" cy="4256871"/>
+              <a:ext cx="2323528" cy="4361490"/>
             </a:xfrm>
             <a:prstGeom prst="rect">
               <a:avLst/>
@@ -4278,7 +4247,7 @@
             </a:lstStyle>
             <a:p>
               <a:r>
-                <a:rPr lang="en-US" altLang="en-US" sz="1200" b="1" dirty="0">
+                <a:rPr lang="en-US" altLang="en-US" sz="1600" b="1" dirty="0">
                   <a:solidFill>
                     <a:srgbClr val="0070C0"/>
                   </a:solidFill>
@@ -4293,12 +4262,12 @@
                 <a:buChar char="•"/>
               </a:pPr>
               <a:r>
-                <a:rPr lang="en-US" altLang="en-US" sz="1050" dirty="0" err="1">
+                <a:rPr lang="en-US" altLang="en-US" sz="1200" dirty="0" err="1">
                   <a:latin typeface="+mn-lt"/>
                 </a:rPr>
                 <a:t>elecByTechTWh</a:t>
               </a:r>
-              <a:endParaRPr lang="en-US" altLang="en-US" sz="1050" dirty="0">
+              <a:endParaRPr lang="en-US" altLang="en-US" sz="1200" dirty="0">
                 <a:latin typeface="+mn-lt"/>
               </a:endParaRPr>
             </a:p>
@@ -4308,12 +4277,12 @@
                 <a:buChar char="•"/>
               </a:pPr>
               <a:r>
-                <a:rPr lang="en-US" altLang="en-US" sz="1050" dirty="0" err="1">
+                <a:rPr lang="en-US" altLang="en-US" sz="1200" dirty="0" err="1">
                   <a:latin typeface="+mn-lt"/>
                 </a:rPr>
                 <a:t>elecCapByFuel</a:t>
               </a:r>
-              <a:endParaRPr lang="en-US" altLang="en-US" sz="1050" dirty="0">
+              <a:endParaRPr lang="en-US" altLang="en-US" sz="1200" dirty="0">
                 <a:latin typeface="+mn-lt"/>
               </a:endParaRPr>
             </a:p>
@@ -4323,12 +4292,12 @@
                 <a:buChar char="•"/>
               </a:pPr>
               <a:r>
-                <a:rPr lang="en-US" altLang="en-US" sz="1050" dirty="0" err="1">
+                <a:rPr lang="en-US" altLang="en-US" sz="1200" dirty="0" err="1">
                   <a:latin typeface="+mn-lt"/>
                 </a:rPr>
                 <a:t>elecFinalBySecTWh</a:t>
               </a:r>
-              <a:endParaRPr lang="en-US" altLang="en-US" sz="1050" dirty="0">
+              <a:endParaRPr lang="en-US" altLang="en-US" sz="1200" dirty="0">
                 <a:latin typeface="+mn-lt"/>
               </a:endParaRPr>
             </a:p>
@@ -4338,23 +4307,23 @@
                 <a:buChar char="•"/>
               </a:pPr>
               <a:r>
-                <a:rPr lang="en-US" altLang="en-US" sz="1050" dirty="0" err="1">
+                <a:rPr lang="en-US" altLang="en-US" sz="1200" dirty="0" err="1">
                   <a:latin typeface="+mn-lt"/>
                 </a:rPr>
                 <a:t>elecFinalByFuelTWh</a:t>
               </a:r>
-              <a:endParaRPr lang="en-US" altLang="en-US" sz="1050" dirty="0">
+              <a:endParaRPr lang="en-US" altLang="en-US" sz="1200" dirty="0">
                 <a:latin typeface="+mn-lt"/>
               </a:endParaRPr>
             </a:p>
             <a:p>
-              <a:endParaRPr lang="en-US" altLang="en-US" sz="1050" dirty="0">
+              <a:endParaRPr lang="en-US" altLang="en-US" sz="1200" dirty="0">
                 <a:latin typeface="+mn-lt"/>
               </a:endParaRPr>
             </a:p>
             <a:p>
               <a:r>
-                <a:rPr lang="en-US" altLang="en-US" sz="1200" b="1" dirty="0">
+                <a:rPr lang="en-US" altLang="en-US" sz="1600" b="1" dirty="0">
                   <a:solidFill>
                     <a:srgbClr val="0070C0"/>
                   </a:solidFill>
@@ -4369,12 +4338,12 @@
                 <a:buChar char="•"/>
               </a:pPr>
               <a:r>
-                <a:rPr lang="en-US" altLang="en-US" sz="1050" dirty="0" err="1">
+                <a:rPr lang="en-US" altLang="en-US" sz="1200" dirty="0" err="1">
                   <a:latin typeface="+mn-lt"/>
                 </a:rPr>
                 <a:t>energyPrimaryByFuelEJ</a:t>
               </a:r>
-              <a:endParaRPr lang="en-US" altLang="en-US" sz="1050" dirty="0">
+              <a:endParaRPr lang="en-US" altLang="en-US" sz="1200" dirty="0">
                 <a:latin typeface="+mn-lt"/>
               </a:endParaRPr>
             </a:p>
@@ -4384,12 +4353,12 @@
                 <a:buChar char="•"/>
               </a:pPr>
               <a:r>
-                <a:rPr lang="en-US" altLang="en-US" sz="1050" dirty="0" err="1">
+                <a:rPr lang="en-US" altLang="en-US" sz="1200" dirty="0" err="1">
                   <a:latin typeface="+mn-lt"/>
                 </a:rPr>
                 <a:t>energyPrimaryRefLiqProdEJ</a:t>
               </a:r>
-              <a:endParaRPr lang="en-US" altLang="en-US" sz="1050" dirty="0">
+              <a:endParaRPr lang="en-US" altLang="en-US" sz="1200" dirty="0">
                 <a:latin typeface="+mn-lt"/>
               </a:endParaRPr>
             </a:p>
@@ -4399,12 +4368,12 @@
                 <a:buChar char="•"/>
               </a:pPr>
               <a:r>
-                <a:rPr lang="en-US" altLang="en-US" sz="1050" dirty="0" err="1">
+                <a:rPr lang="en-US" altLang="en-US" sz="1200" dirty="0" err="1">
                   <a:latin typeface="+mn-lt"/>
                 </a:rPr>
                 <a:t>energyPrimaryByFuelEJ</a:t>
               </a:r>
-              <a:endParaRPr lang="en-US" altLang="en-US" sz="1050" dirty="0">
+              <a:endParaRPr lang="en-US" altLang="en-US" sz="1200" dirty="0">
                 <a:latin typeface="+mn-lt"/>
               </a:endParaRPr>
             </a:p>
@@ -4414,12 +4383,12 @@
                 <a:buChar char="•"/>
               </a:pPr>
               <a:r>
-                <a:rPr lang="en-US" altLang="en-US" sz="1050" dirty="0" err="1">
+                <a:rPr lang="en-US" altLang="en-US" sz="1200" dirty="0" err="1">
                   <a:latin typeface="+mn-lt"/>
                 </a:rPr>
                 <a:t>energyFinalSubsecByFuelTranspEJ</a:t>
               </a:r>
-              <a:endParaRPr lang="en-US" altLang="en-US" sz="1050" dirty="0">
+              <a:endParaRPr lang="en-US" altLang="en-US" sz="1200" dirty="0">
                 <a:latin typeface="+mn-lt"/>
               </a:endParaRPr>
             </a:p>
@@ -4429,12 +4398,12 @@
                 <a:buChar char="•"/>
               </a:pPr>
               <a:r>
-                <a:rPr lang="en-US" altLang="en-US" sz="1050" dirty="0" err="1">
+                <a:rPr lang="en-US" altLang="en-US" sz="1200" dirty="0" err="1">
                   <a:latin typeface="+mn-lt"/>
                 </a:rPr>
                 <a:t>energyFinalSubsecByFuelIndusEJ</a:t>
               </a:r>
-              <a:endParaRPr lang="en-US" altLang="en-US" sz="1050" dirty="0">
+              <a:endParaRPr lang="en-US" altLang="en-US" sz="1200" dirty="0">
                 <a:latin typeface="+mn-lt"/>
               </a:endParaRPr>
             </a:p>
@@ -4444,12 +4413,12 @@
                 <a:buChar char="•"/>
               </a:pPr>
               <a:r>
-                <a:rPr lang="en-US" altLang="en-US" sz="1050" dirty="0" err="1">
+                <a:rPr lang="en-US" altLang="en-US" sz="1200" dirty="0" err="1">
                   <a:latin typeface="+mn-lt"/>
                 </a:rPr>
                 <a:t>energyFinalSubsecByFuelBuildEJ</a:t>
               </a:r>
-              <a:endParaRPr lang="en-US" altLang="en-US" sz="1050" dirty="0">
+              <a:endParaRPr lang="en-US" altLang="en-US" sz="1200" dirty="0">
                 <a:latin typeface="+mn-lt"/>
               </a:endParaRPr>
             </a:p>
@@ -4459,12 +4428,12 @@
                 <a:buChar char="•"/>
               </a:pPr>
               <a:r>
-                <a:rPr lang="en-US" altLang="en-US" sz="1050" dirty="0" err="1">
+                <a:rPr lang="en-US" altLang="en-US" sz="1200" dirty="0" err="1">
                   <a:latin typeface="+mn-lt"/>
                 </a:rPr>
                 <a:t>energyFinalByFuelBySectorEJ</a:t>
               </a:r>
-              <a:endParaRPr lang="en-US" altLang="en-US" sz="1050" dirty="0">
+              <a:endParaRPr lang="en-US" altLang="en-US" sz="1200" dirty="0">
                 <a:latin typeface="+mn-lt"/>
               </a:endParaRPr>
             </a:p>
@@ -4474,12 +4443,12 @@
                 <a:buChar char="•"/>
               </a:pPr>
               <a:r>
-                <a:rPr lang="en-US" altLang="en-US" sz="1050" dirty="0" err="1">
+                <a:rPr lang="en-US" altLang="en-US" sz="1200" dirty="0" err="1">
                   <a:latin typeface="+mn-lt"/>
                 </a:rPr>
                 <a:t>energyFinalSubsecBySectorBuildEJ</a:t>
               </a:r>
-              <a:endParaRPr lang="en-US" altLang="en-US" sz="1050" dirty="0">
+              <a:endParaRPr lang="en-US" altLang="en-US" sz="1200" dirty="0">
                 <a:latin typeface="+mn-lt"/>
               </a:endParaRPr>
             </a:p>
@@ -4489,12 +4458,12 @@
                 <a:buChar char="•"/>
               </a:pPr>
               <a:r>
-                <a:rPr lang="en-US" altLang="en-US" sz="1050" dirty="0" err="1">
+                <a:rPr lang="en-US" altLang="en-US" sz="1200" dirty="0" err="1">
                   <a:latin typeface="+mn-lt"/>
                 </a:rPr>
                 <a:t>energyFinalConsumBySecEJ</a:t>
               </a:r>
-              <a:endParaRPr lang="en-US" altLang="en-US" sz="1050" dirty="0">
+              <a:endParaRPr lang="en-US" altLang="en-US" sz="1200" dirty="0">
                 <a:latin typeface="+mn-lt"/>
               </a:endParaRPr>
             </a:p>
@@ -4504,12 +4473,12 @@
                 <a:buChar char="•"/>
               </a:pPr>
               <a:r>
-                <a:rPr lang="en-US" altLang="en-US" sz="1050" dirty="0" err="1">
+                <a:rPr lang="en-US" altLang="en-US" sz="1200" dirty="0" err="1">
                   <a:latin typeface="+mn-lt"/>
                 </a:rPr>
                 <a:t>energyFinalConsumByIntlShpAvEJ</a:t>
               </a:r>
-              <a:endParaRPr lang="en-US" altLang="en-US" sz="1050" dirty="0">
+              <a:endParaRPr lang="en-US" altLang="en-US" sz="1200" dirty="0">
                 <a:latin typeface="+mn-lt"/>
               </a:endParaRPr>
             </a:p>
@@ -4529,8 +4498,8 @@
           </p:nvSpPr>
           <p:spPr>
             <a:xfrm>
-              <a:off x="5174854" y="661312"/>
-              <a:ext cx="2066223" cy="369332"/>
+              <a:off x="1319952" y="661312"/>
+              <a:ext cx="10124131" cy="406171"/>
             </a:xfrm>
             <a:prstGeom prst="rect">
               <a:avLst/>
@@ -4545,8 +4514,8 @@
             <a:p>
               <a:pPr algn="ctr"/>
               <a:r>
-                <a:rPr lang="en-US" b="1" dirty="0"/>
-                <a:t>Parameter List</a:t>
+                <a:rPr lang="en-US" sz="2400" b="1" dirty="0"/>
+                <a:t>Selected Parameter List</a:t>
               </a:r>
             </a:p>
           </p:txBody>
@@ -4681,6 +4650,78 @@
           </p:style>
         </p:cxnSp>
       </p:grpSp>
+      <p:sp>
+        <p:nvSpPr>
+          <p:cNvPr id="15" name="TextBox 14">
+            <a:extLst>
+              <a:ext uri="{FF2B5EF4-FFF2-40B4-BE49-F238E27FC236}">
+                <a16:creationId xmlns:a16="http://schemas.microsoft.com/office/drawing/2014/main" id="{69D3AAE1-F480-41EA-9CF6-CDB0FC89BEB0}"/>
+              </a:ext>
+            </a:extLst>
+          </p:cNvPr>
+          <p:cNvSpPr txBox="1"/>
+          <p:nvPr/>
+        </p:nvSpPr>
+        <p:spPr>
+          <a:xfrm>
+            <a:off x="265472" y="6056759"/>
+            <a:ext cx="11812386" cy="307777"/>
+          </a:xfrm>
+          <a:prstGeom prst="rect">
+            <a:avLst/>
+          </a:prstGeom>
+          <a:noFill/>
+        </p:spPr>
+        <p:txBody>
+          <a:bodyPr wrap="square" rtlCol="0">
+            <a:spAutoFit/>
+          </a:bodyPr>
+          <a:lstStyle/>
+          <a:p>
+            <a:pPr algn="ctr"/>
+            <a:r>
+              <a:rPr lang="en-US" sz="1400" b="1" dirty="0">
+                <a:solidFill>
+                  <a:srgbClr val="BE0F34"/>
+                </a:solidFill>
+              </a:rPr>
+              <a:t>* </a:t>
+            </a:r>
+            <a:r>
+              <a:rPr lang="en-US" sz="1400" b="1" dirty="0" err="1">
+                <a:solidFill>
+                  <a:srgbClr val="BE0F34"/>
+                </a:solidFill>
+              </a:rPr>
+              <a:t>gcamextractor</a:t>
+            </a:r>
+            <a:r>
+              <a:rPr lang="en-US" sz="1400" b="1" dirty="0">
+                <a:solidFill>
+                  <a:srgbClr val="BE0F34"/>
+                </a:solidFill>
+              </a:rPr>
+              <a:t>::</a:t>
+            </a:r>
+            <a:r>
+              <a:rPr lang="en-US" sz="1400" b="1" dirty="0" err="1">
+                <a:solidFill>
+                  <a:srgbClr val="BE0F34"/>
+                </a:solidFill>
+              </a:rPr>
+              <a:t>map_param_query</a:t>
+            </a:r>
+            <a:r>
+              <a:rPr lang="en-US" sz="1400" b="1" dirty="0">
+                <a:solidFill>
+                  <a:srgbClr val="BE0F34"/>
+                </a:solidFill>
+              </a:rPr>
+              <a:t> for complete list of all groups, parameters and related queries</a:t>
+            </a:r>
+          </a:p>
+        </p:txBody>
+      </p:sp>
     </p:spTree>
     <p:extLst>
       <p:ext uri="{BB962C8B-B14F-4D97-AF65-F5344CB8AC3E}">

</xml_diff>